<commit_message>
Node JS with Webpack full integration complete
</commit_message>
<xml_diff>
--- a/assets/mvc.pptx
+++ b/assets/mvc.pptx
@@ -8,6 +8,7 @@
     <p:sldId id="256" r:id="rId2"/>
     <p:sldId id="257" r:id="rId3"/>
     <p:sldId id="258" r:id="rId4"/>
+    <p:sldId id="259" r:id="rId5"/>
   </p:sldIdLst>
   <p:sldSz cx="12192000" cy="6858000"/>
   <p:notesSz cx="6858000" cy="9144000"/>
@@ -245,7 +246,7 @@
           <a:p>
             <a:fld id="{6C5C6CF4-99EB-4C46-9C25-5E6192ACBD0F}" type="datetimeFigureOut">
               <a:rPr lang="en-US" smtClean="0"/>
-              <a:t>12/31/2018</a:t>
+              <a:t>1/26/2019</a:t>
             </a:fld>
             <a:endParaRPr lang="en-US"/>
           </a:p>
@@ -415,7 +416,7 @@
           <a:p>
             <a:fld id="{6C5C6CF4-99EB-4C46-9C25-5E6192ACBD0F}" type="datetimeFigureOut">
               <a:rPr lang="en-US" smtClean="0"/>
-              <a:t>12/31/2018</a:t>
+              <a:t>1/26/2019</a:t>
             </a:fld>
             <a:endParaRPr lang="en-US"/>
           </a:p>
@@ -595,7 +596,7 @@
           <a:p>
             <a:fld id="{6C5C6CF4-99EB-4C46-9C25-5E6192ACBD0F}" type="datetimeFigureOut">
               <a:rPr lang="en-US" smtClean="0"/>
-              <a:t>12/31/2018</a:t>
+              <a:t>1/26/2019</a:t>
             </a:fld>
             <a:endParaRPr lang="en-US"/>
           </a:p>
@@ -765,7 +766,7 @@
           <a:p>
             <a:fld id="{6C5C6CF4-99EB-4C46-9C25-5E6192ACBD0F}" type="datetimeFigureOut">
               <a:rPr lang="en-US" smtClean="0"/>
-              <a:t>12/31/2018</a:t>
+              <a:t>1/26/2019</a:t>
             </a:fld>
             <a:endParaRPr lang="en-US"/>
           </a:p>
@@ -1011,7 +1012,7 @@
           <a:p>
             <a:fld id="{6C5C6CF4-99EB-4C46-9C25-5E6192ACBD0F}" type="datetimeFigureOut">
               <a:rPr lang="en-US" smtClean="0"/>
-              <a:t>12/31/2018</a:t>
+              <a:t>1/26/2019</a:t>
             </a:fld>
             <a:endParaRPr lang="en-US"/>
           </a:p>
@@ -1243,7 +1244,7 @@
           <a:p>
             <a:fld id="{6C5C6CF4-99EB-4C46-9C25-5E6192ACBD0F}" type="datetimeFigureOut">
               <a:rPr lang="en-US" smtClean="0"/>
-              <a:t>12/31/2018</a:t>
+              <a:t>1/26/2019</a:t>
             </a:fld>
             <a:endParaRPr lang="en-US"/>
           </a:p>
@@ -1610,7 +1611,7 @@
           <a:p>
             <a:fld id="{6C5C6CF4-99EB-4C46-9C25-5E6192ACBD0F}" type="datetimeFigureOut">
               <a:rPr lang="en-US" smtClean="0"/>
-              <a:t>12/31/2018</a:t>
+              <a:t>1/26/2019</a:t>
             </a:fld>
             <a:endParaRPr lang="en-US"/>
           </a:p>
@@ -1728,7 +1729,7 @@
           <a:p>
             <a:fld id="{6C5C6CF4-99EB-4C46-9C25-5E6192ACBD0F}" type="datetimeFigureOut">
               <a:rPr lang="en-US" smtClean="0"/>
-              <a:t>12/31/2018</a:t>
+              <a:t>1/26/2019</a:t>
             </a:fld>
             <a:endParaRPr lang="en-US"/>
           </a:p>
@@ -1823,7 +1824,7 @@
           <a:p>
             <a:fld id="{6C5C6CF4-99EB-4C46-9C25-5E6192ACBD0F}" type="datetimeFigureOut">
               <a:rPr lang="en-US" smtClean="0"/>
-              <a:t>12/31/2018</a:t>
+              <a:t>1/26/2019</a:t>
             </a:fld>
             <a:endParaRPr lang="en-US"/>
           </a:p>
@@ -2100,7 +2101,7 @@
           <a:p>
             <a:fld id="{6C5C6CF4-99EB-4C46-9C25-5E6192ACBD0F}" type="datetimeFigureOut">
               <a:rPr lang="en-US" smtClean="0"/>
-              <a:t>12/31/2018</a:t>
+              <a:t>1/26/2019</a:t>
             </a:fld>
             <a:endParaRPr lang="en-US"/>
           </a:p>
@@ -2353,7 +2354,7 @@
           <a:p>
             <a:fld id="{6C5C6CF4-99EB-4C46-9C25-5E6192ACBD0F}" type="datetimeFigureOut">
               <a:rPr lang="en-US" smtClean="0"/>
-              <a:t>12/31/2018</a:t>
+              <a:t>1/26/2019</a:t>
             </a:fld>
             <a:endParaRPr lang="en-US"/>
           </a:p>
@@ -2566,7 +2567,7 @@
           <a:p>
             <a:fld id="{6C5C6CF4-99EB-4C46-9C25-5E6192ACBD0F}" type="datetimeFigureOut">
               <a:rPr lang="en-US" smtClean="0"/>
-              <a:t>12/31/2018</a:t>
+              <a:t>1/26/2019</a:t>
             </a:fld>
             <a:endParaRPr lang="en-US"/>
           </a:p>
@@ -3863,6 +3864,807 @@
 </p:sld>
 </file>
 
+<file path=ppt/slides/slide4.xml><?xml version="1.0" encoding="utf-8"?>
+<p:sld xmlns:a="http://schemas.openxmlformats.org/drawingml/2006/main" xmlns:r="http://schemas.openxmlformats.org/officeDocument/2006/relationships" xmlns:p="http://schemas.openxmlformats.org/presentationml/2006/main">
+  <p:cSld>
+    <p:spTree>
+      <p:nvGrpSpPr>
+        <p:cNvPr id="1" name=""/>
+        <p:cNvGrpSpPr/>
+        <p:nvPr/>
+      </p:nvGrpSpPr>
+      <p:grpSpPr>
+        <a:xfrm>
+          <a:off x="0" y="0"/>
+          <a:ext cx="0" cy="0"/>
+          <a:chOff x="0" y="0"/>
+          <a:chExt cx="0" cy="0"/>
+        </a:xfrm>
+      </p:grpSpPr>
+      <p:sp>
+        <p:nvSpPr>
+          <p:cNvPr id="23" name="Right Arrow 22"/>
+          <p:cNvSpPr/>
+          <p:nvPr/>
+        </p:nvSpPr>
+        <p:spPr>
+          <a:xfrm>
+            <a:off x="2797787" y="1157174"/>
+            <a:ext cx="6155143" cy="686368"/>
+          </a:xfrm>
+          <a:prstGeom prst="rightArrow">
+            <a:avLst/>
+          </a:prstGeom>
+        </p:spPr>
+        <p:style>
+          <a:lnRef idx="2">
+            <a:schemeClr val="accent4">
+              <a:shade val="50000"/>
+            </a:schemeClr>
+          </a:lnRef>
+          <a:fillRef idx="1">
+            <a:schemeClr val="accent4"/>
+          </a:fillRef>
+          <a:effectRef idx="0">
+            <a:schemeClr val="accent4"/>
+          </a:effectRef>
+          <a:fontRef idx="minor">
+            <a:schemeClr val="lt1"/>
+          </a:fontRef>
+        </p:style>
+        <p:txBody>
+          <a:bodyPr rtlCol="0" anchor="ctr"/>
+          <a:lstStyle/>
+          <a:p>
+            <a:pPr algn="ctr"/>
+            <a:endParaRPr lang="en-US"/>
+          </a:p>
+        </p:txBody>
+      </p:sp>
+      <p:sp>
+        <p:nvSpPr>
+          <p:cNvPr id="24" name="Right Arrow 23"/>
+          <p:cNvSpPr/>
+          <p:nvPr/>
+        </p:nvSpPr>
+        <p:spPr>
+          <a:xfrm>
+            <a:off x="2797786" y="3288543"/>
+            <a:ext cx="6155143" cy="686368"/>
+          </a:xfrm>
+          <a:prstGeom prst="rightArrow">
+            <a:avLst/>
+          </a:prstGeom>
+        </p:spPr>
+        <p:style>
+          <a:lnRef idx="2">
+            <a:schemeClr val="accent4">
+              <a:shade val="50000"/>
+            </a:schemeClr>
+          </a:lnRef>
+          <a:fillRef idx="1">
+            <a:schemeClr val="accent4"/>
+          </a:fillRef>
+          <a:effectRef idx="0">
+            <a:schemeClr val="accent4"/>
+          </a:effectRef>
+          <a:fontRef idx="minor">
+            <a:schemeClr val="lt1"/>
+          </a:fontRef>
+        </p:style>
+        <p:txBody>
+          <a:bodyPr rtlCol="0" anchor="ctr"/>
+          <a:lstStyle/>
+          <a:p>
+            <a:pPr algn="ctr"/>
+            <a:endParaRPr lang="en-US"/>
+          </a:p>
+        </p:txBody>
+      </p:sp>
+      <p:sp>
+        <p:nvSpPr>
+          <p:cNvPr id="4" name="Rounded Rectangle 3"/>
+          <p:cNvSpPr/>
+          <p:nvPr/>
+        </p:nvSpPr>
+        <p:spPr>
+          <a:xfrm>
+            <a:off x="4421874" y="2311876"/>
+            <a:ext cx="3098041" cy="1787856"/>
+          </a:xfrm>
+          <a:prstGeom prst="roundRect">
+            <a:avLst/>
+          </a:prstGeom>
+        </p:spPr>
+        <p:style>
+          <a:lnRef idx="2">
+            <a:schemeClr val="accent1">
+              <a:shade val="50000"/>
+            </a:schemeClr>
+          </a:lnRef>
+          <a:fillRef idx="1">
+            <a:schemeClr val="accent1"/>
+          </a:fillRef>
+          <a:effectRef idx="0">
+            <a:schemeClr val="accent1"/>
+          </a:effectRef>
+          <a:fontRef idx="minor">
+            <a:schemeClr val="lt1"/>
+          </a:fontRef>
+        </p:style>
+        <p:txBody>
+          <a:bodyPr rtlCol="0" anchor="ctr"/>
+          <a:lstStyle/>
+          <a:p>
+            <a:pPr algn="ctr"/>
+            <a:r>
+              <a:rPr lang="en-US" dirty="0" smtClean="0"/>
+              <a:t>index.js</a:t>
+            </a:r>
+            <a:endParaRPr lang="en-US" dirty="0"/>
+          </a:p>
+        </p:txBody>
+      </p:sp>
+      <p:sp>
+        <p:nvSpPr>
+          <p:cNvPr id="5" name="TextBox 4"/>
+          <p:cNvSpPr txBox="1"/>
+          <p:nvPr/>
+        </p:nvSpPr>
+        <p:spPr>
+          <a:xfrm>
+            <a:off x="409433" y="333233"/>
+            <a:ext cx="2934269" cy="584775"/>
+          </a:xfrm>
+          <a:prstGeom prst="rect">
+            <a:avLst/>
+          </a:prstGeom>
+          <a:noFill/>
+        </p:spPr>
+        <p:txBody>
+          <a:bodyPr wrap="square" rtlCol="0">
+            <a:spAutoFit/>
+          </a:bodyPr>
+          <a:lstStyle/>
+          <a:p>
+            <a:r>
+              <a:rPr lang="en-US" sz="3200" dirty="0" smtClean="0"/>
+              <a:t>UI Controller</a:t>
+            </a:r>
+            <a:endParaRPr lang="en-US" sz="3200" dirty="0"/>
+          </a:p>
+        </p:txBody>
+      </p:sp>
+      <p:sp>
+        <p:nvSpPr>
+          <p:cNvPr id="6" name="TextBox 5"/>
+          <p:cNvSpPr txBox="1"/>
+          <p:nvPr/>
+        </p:nvSpPr>
+        <p:spPr>
+          <a:xfrm>
+            <a:off x="8952931" y="319585"/>
+            <a:ext cx="2934269" cy="584775"/>
+          </a:xfrm>
+          <a:prstGeom prst="rect">
+            <a:avLst/>
+          </a:prstGeom>
+          <a:noFill/>
+        </p:spPr>
+        <p:txBody>
+          <a:bodyPr wrap="square" rtlCol="0">
+            <a:spAutoFit/>
+          </a:bodyPr>
+          <a:lstStyle/>
+          <a:p>
+            <a:r>
+              <a:rPr lang="en-US" sz="3200" dirty="0" smtClean="0"/>
+              <a:t>Data Controller</a:t>
+            </a:r>
+            <a:endParaRPr lang="en-US" sz="3200" dirty="0"/>
+          </a:p>
+        </p:txBody>
+      </p:sp>
+      <p:sp>
+        <p:nvSpPr>
+          <p:cNvPr id="7" name="TextBox 6"/>
+          <p:cNvSpPr txBox="1"/>
+          <p:nvPr/>
+        </p:nvSpPr>
+        <p:spPr>
+          <a:xfrm>
+            <a:off x="4421875" y="319585"/>
+            <a:ext cx="3452883" cy="584775"/>
+          </a:xfrm>
+          <a:prstGeom prst="rect">
+            <a:avLst/>
+          </a:prstGeom>
+          <a:noFill/>
+        </p:spPr>
+        <p:txBody>
+          <a:bodyPr wrap="square" rtlCol="0">
+            <a:spAutoFit/>
+          </a:bodyPr>
+          <a:lstStyle/>
+          <a:p>
+            <a:r>
+              <a:rPr lang="en-US" sz="3200" dirty="0" smtClean="0"/>
+              <a:t>Controller Module</a:t>
+            </a:r>
+            <a:endParaRPr lang="en-US" sz="3200" dirty="0"/>
+          </a:p>
+        </p:txBody>
+      </p:sp>
+      <p:sp>
+        <p:nvSpPr>
+          <p:cNvPr id="8" name="Rounded Rectangle 7"/>
+          <p:cNvSpPr/>
+          <p:nvPr/>
+        </p:nvSpPr>
+        <p:spPr>
+          <a:xfrm>
+            <a:off x="8789159" y="1046898"/>
+            <a:ext cx="3098041" cy="889946"/>
+          </a:xfrm>
+          <a:prstGeom prst="roundRect">
+            <a:avLst/>
+          </a:prstGeom>
+        </p:spPr>
+        <p:style>
+          <a:lnRef idx="2">
+            <a:schemeClr val="accent1">
+              <a:shade val="50000"/>
+            </a:schemeClr>
+          </a:lnRef>
+          <a:fillRef idx="1">
+            <a:schemeClr val="accent1"/>
+          </a:fillRef>
+          <a:effectRef idx="0">
+            <a:schemeClr val="accent1"/>
+          </a:effectRef>
+          <a:fontRef idx="minor">
+            <a:schemeClr val="lt1"/>
+          </a:fontRef>
+        </p:style>
+        <p:txBody>
+          <a:bodyPr rtlCol="0" anchor="ctr"/>
+          <a:lstStyle/>
+          <a:p>
+            <a:pPr algn="ctr"/>
+            <a:r>
+              <a:rPr lang="en-US" dirty="0" smtClean="0"/>
+              <a:t>Main.js</a:t>
+            </a:r>
+            <a:endParaRPr lang="en-US" dirty="0"/>
+          </a:p>
+        </p:txBody>
+      </p:sp>
+      <p:sp>
+        <p:nvSpPr>
+          <p:cNvPr id="9" name="Rounded Rectangle 8"/>
+          <p:cNvSpPr/>
+          <p:nvPr/>
+        </p:nvSpPr>
+        <p:spPr>
+          <a:xfrm>
+            <a:off x="54591" y="1046898"/>
+            <a:ext cx="3098041" cy="889946"/>
+          </a:xfrm>
+          <a:prstGeom prst="roundRect">
+            <a:avLst/>
+          </a:prstGeom>
+        </p:spPr>
+        <p:style>
+          <a:lnRef idx="0">
+            <a:schemeClr val="accent3"/>
+          </a:lnRef>
+          <a:fillRef idx="3">
+            <a:schemeClr val="accent3"/>
+          </a:fillRef>
+          <a:effectRef idx="3">
+            <a:schemeClr val="accent3"/>
+          </a:effectRef>
+          <a:fontRef idx="minor">
+            <a:schemeClr val="lt1"/>
+          </a:fontRef>
+        </p:style>
+        <p:txBody>
+          <a:bodyPr rtlCol="0" anchor="ctr"/>
+          <a:lstStyle/>
+          <a:p>
+            <a:pPr algn="ctr"/>
+            <a:r>
+              <a:rPr lang="en-US" dirty="0" smtClean="0"/>
+              <a:t>mainView.js</a:t>
+            </a:r>
+            <a:endParaRPr lang="en-US" dirty="0"/>
+          </a:p>
+        </p:txBody>
+      </p:sp>
+      <p:sp>
+        <p:nvSpPr>
+          <p:cNvPr id="10" name="Rounded Rectangle 9"/>
+          <p:cNvSpPr/>
+          <p:nvPr/>
+        </p:nvSpPr>
+        <p:spPr>
+          <a:xfrm>
+            <a:off x="54590" y="4320920"/>
+            <a:ext cx="3098041" cy="889946"/>
+          </a:xfrm>
+          <a:prstGeom prst="roundRect">
+            <a:avLst/>
+          </a:prstGeom>
+        </p:spPr>
+        <p:style>
+          <a:lnRef idx="2">
+            <a:schemeClr val="accent1">
+              <a:shade val="50000"/>
+            </a:schemeClr>
+          </a:lnRef>
+          <a:fillRef idx="1">
+            <a:schemeClr val="accent1"/>
+          </a:fillRef>
+          <a:effectRef idx="0">
+            <a:schemeClr val="accent1"/>
+          </a:effectRef>
+          <a:fontRef idx="minor">
+            <a:schemeClr val="lt1"/>
+          </a:fontRef>
+        </p:style>
+        <p:txBody>
+          <a:bodyPr rtlCol="0" anchor="ctr"/>
+          <a:lstStyle/>
+          <a:p>
+            <a:pPr algn="ctr"/>
+            <a:r>
+              <a:rPr lang="en-US" dirty="0" smtClean="0"/>
+              <a:t>base.js</a:t>
+            </a:r>
+            <a:endParaRPr lang="en-US" dirty="0"/>
+          </a:p>
+        </p:txBody>
+      </p:sp>
+      <p:sp>
+        <p:nvSpPr>
+          <p:cNvPr id="11" name="Rounded Rectangle 10"/>
+          <p:cNvSpPr/>
+          <p:nvPr/>
+        </p:nvSpPr>
+        <p:spPr>
+          <a:xfrm>
+            <a:off x="8789159" y="2116826"/>
+            <a:ext cx="3098041" cy="889946"/>
+          </a:xfrm>
+          <a:prstGeom prst="roundRect">
+            <a:avLst/>
+          </a:prstGeom>
+        </p:spPr>
+        <p:style>
+          <a:lnRef idx="2">
+            <a:schemeClr val="accent1">
+              <a:shade val="50000"/>
+            </a:schemeClr>
+          </a:lnRef>
+          <a:fillRef idx="1">
+            <a:schemeClr val="accent1"/>
+          </a:fillRef>
+          <a:effectRef idx="0">
+            <a:schemeClr val="accent1"/>
+          </a:effectRef>
+          <a:fontRef idx="minor">
+            <a:schemeClr val="lt1"/>
+          </a:fontRef>
+        </p:style>
+        <p:txBody>
+          <a:bodyPr rtlCol="0" anchor="ctr"/>
+          <a:lstStyle/>
+          <a:p>
+            <a:pPr algn="ctr"/>
+            <a:r>
+              <a:rPr lang="en-US" dirty="0" smtClean="0"/>
+              <a:t>AIsingle.js</a:t>
+            </a:r>
+            <a:endParaRPr lang="en-US" dirty="0"/>
+          </a:p>
+        </p:txBody>
+      </p:sp>
+      <p:sp>
+        <p:nvSpPr>
+          <p:cNvPr id="12" name="Rounded Rectangle 11"/>
+          <p:cNvSpPr/>
+          <p:nvPr/>
+        </p:nvSpPr>
+        <p:spPr>
+          <a:xfrm>
+            <a:off x="8789159" y="3205804"/>
+            <a:ext cx="3098041" cy="889946"/>
+          </a:xfrm>
+          <a:prstGeom prst="roundRect">
+            <a:avLst/>
+          </a:prstGeom>
+        </p:spPr>
+        <p:style>
+          <a:lnRef idx="2">
+            <a:schemeClr val="accent1">
+              <a:shade val="50000"/>
+            </a:schemeClr>
+          </a:lnRef>
+          <a:fillRef idx="1">
+            <a:schemeClr val="accent1"/>
+          </a:fillRef>
+          <a:effectRef idx="0">
+            <a:schemeClr val="accent1"/>
+          </a:effectRef>
+          <a:fontRef idx="minor">
+            <a:schemeClr val="lt1"/>
+          </a:fontRef>
+        </p:style>
+        <p:txBody>
+          <a:bodyPr rtlCol="0" anchor="ctr"/>
+          <a:lstStyle/>
+          <a:p>
+            <a:pPr algn="ctr"/>
+            <a:r>
+              <a:rPr lang="en-US" dirty="0" smtClean="0"/>
+              <a:t>ScoreBoard.js</a:t>
+            </a:r>
+            <a:endParaRPr lang="en-US" dirty="0"/>
+          </a:p>
+        </p:txBody>
+      </p:sp>
+      <p:sp>
+        <p:nvSpPr>
+          <p:cNvPr id="13" name="Rounded Rectangle 12"/>
+          <p:cNvSpPr/>
+          <p:nvPr/>
+        </p:nvSpPr>
+        <p:spPr>
+          <a:xfrm>
+            <a:off x="54590" y="3238945"/>
+            <a:ext cx="3098041" cy="856805"/>
+          </a:xfrm>
+          <a:prstGeom prst="roundRect">
+            <a:avLst/>
+          </a:prstGeom>
+        </p:spPr>
+        <p:style>
+          <a:lnRef idx="2">
+            <a:schemeClr val="accent1">
+              <a:shade val="50000"/>
+            </a:schemeClr>
+          </a:lnRef>
+          <a:fillRef idx="1">
+            <a:schemeClr val="accent1"/>
+          </a:fillRef>
+          <a:effectRef idx="0">
+            <a:schemeClr val="accent1"/>
+          </a:effectRef>
+          <a:fontRef idx="minor">
+            <a:schemeClr val="lt1"/>
+          </a:fontRef>
+        </p:style>
+        <p:txBody>
+          <a:bodyPr rtlCol="0" anchor="ctr"/>
+          <a:lstStyle/>
+          <a:p>
+            <a:pPr algn="ctr"/>
+            <a:r>
+              <a:rPr lang="en-US" dirty="0" smtClean="0"/>
+              <a:t>scoreBoardView.js</a:t>
+            </a:r>
+            <a:endParaRPr lang="en-US" dirty="0"/>
+          </a:p>
+        </p:txBody>
+      </p:sp>
+      <p:sp>
+        <p:nvSpPr>
+          <p:cNvPr id="14" name="Rounded Rectangle 13"/>
+          <p:cNvSpPr/>
+          <p:nvPr/>
+        </p:nvSpPr>
+        <p:spPr>
+          <a:xfrm>
+            <a:off x="8789158" y="5519914"/>
+            <a:ext cx="3098041" cy="889946"/>
+          </a:xfrm>
+          <a:prstGeom prst="roundRect">
+            <a:avLst/>
+          </a:prstGeom>
+        </p:spPr>
+        <p:style>
+          <a:lnRef idx="2">
+            <a:schemeClr val="accent1">
+              <a:shade val="50000"/>
+            </a:schemeClr>
+          </a:lnRef>
+          <a:fillRef idx="1">
+            <a:schemeClr val="accent1"/>
+          </a:fillRef>
+          <a:effectRef idx="0">
+            <a:schemeClr val="accent1"/>
+          </a:effectRef>
+          <a:fontRef idx="minor">
+            <a:schemeClr val="lt1"/>
+          </a:fontRef>
+        </p:style>
+        <p:txBody>
+          <a:bodyPr rtlCol="0" anchor="ctr"/>
+          <a:lstStyle/>
+          <a:p>
+            <a:pPr algn="ctr"/>
+            <a:r>
+              <a:rPr lang="en-US" dirty="0" smtClean="0"/>
+              <a:t>OnlineMulti.js</a:t>
+            </a:r>
+            <a:endParaRPr lang="en-US" dirty="0"/>
+          </a:p>
+        </p:txBody>
+      </p:sp>
+      <p:cxnSp>
+        <p:nvCxnSpPr>
+          <p:cNvPr id="16" name="Straight Arrow Connector 15"/>
+          <p:cNvCxnSpPr>
+            <a:stCxn id="4" idx="3"/>
+            <a:endCxn id="8" idx="1"/>
+          </p:cNvCxnSpPr>
+          <p:nvPr/>
+        </p:nvCxnSpPr>
+        <p:spPr>
+          <a:xfrm flipV="1">
+            <a:off x="7519915" y="1491871"/>
+            <a:ext cx="1269244" cy="1713933"/>
+          </a:xfrm>
+          <a:prstGeom prst="straightConnector1">
+            <a:avLst/>
+          </a:prstGeom>
+          <a:ln>
+            <a:tailEnd type="triangle"/>
+          </a:ln>
+        </p:spPr>
+        <p:style>
+          <a:lnRef idx="1">
+            <a:schemeClr val="accent1"/>
+          </a:lnRef>
+          <a:fillRef idx="0">
+            <a:schemeClr val="accent1"/>
+          </a:fillRef>
+          <a:effectRef idx="0">
+            <a:schemeClr val="accent1"/>
+          </a:effectRef>
+          <a:fontRef idx="minor">
+            <a:schemeClr val="tx1"/>
+          </a:fontRef>
+        </p:style>
+      </p:cxnSp>
+      <p:cxnSp>
+        <p:nvCxnSpPr>
+          <p:cNvPr id="17" name="Straight Arrow Connector 16"/>
+          <p:cNvCxnSpPr>
+            <a:endCxn id="11" idx="1"/>
+          </p:cNvCxnSpPr>
+          <p:nvPr/>
+        </p:nvCxnSpPr>
+        <p:spPr>
+          <a:xfrm flipV="1">
+            <a:off x="7519914" y="2561799"/>
+            <a:ext cx="1269245" cy="644006"/>
+          </a:xfrm>
+          <a:prstGeom prst="straightConnector1">
+            <a:avLst/>
+          </a:prstGeom>
+          <a:ln>
+            <a:tailEnd type="triangle"/>
+          </a:ln>
+        </p:spPr>
+        <p:style>
+          <a:lnRef idx="1">
+            <a:schemeClr val="accent1"/>
+          </a:lnRef>
+          <a:fillRef idx="0">
+            <a:schemeClr val="accent1"/>
+          </a:fillRef>
+          <a:effectRef idx="0">
+            <a:schemeClr val="accent1"/>
+          </a:effectRef>
+          <a:fontRef idx="minor">
+            <a:schemeClr val="tx1"/>
+          </a:fontRef>
+        </p:style>
+      </p:cxnSp>
+      <p:cxnSp>
+        <p:nvCxnSpPr>
+          <p:cNvPr id="19" name="Straight Arrow Connector 18"/>
+          <p:cNvCxnSpPr>
+            <a:endCxn id="12" idx="1"/>
+          </p:cNvCxnSpPr>
+          <p:nvPr/>
+        </p:nvCxnSpPr>
+        <p:spPr>
+          <a:xfrm>
+            <a:off x="7519914" y="3168843"/>
+            <a:ext cx="1269245" cy="481934"/>
+          </a:xfrm>
+          <a:prstGeom prst="straightConnector1">
+            <a:avLst/>
+          </a:prstGeom>
+          <a:ln>
+            <a:tailEnd type="triangle"/>
+          </a:ln>
+        </p:spPr>
+        <p:style>
+          <a:lnRef idx="1">
+            <a:schemeClr val="accent1"/>
+          </a:lnRef>
+          <a:fillRef idx="0">
+            <a:schemeClr val="accent1"/>
+          </a:fillRef>
+          <a:effectRef idx="0">
+            <a:schemeClr val="accent1"/>
+          </a:effectRef>
+          <a:fontRef idx="minor">
+            <a:schemeClr val="tx1"/>
+          </a:fontRef>
+        </p:style>
+      </p:cxnSp>
+      <p:cxnSp>
+        <p:nvCxnSpPr>
+          <p:cNvPr id="21" name="Straight Arrow Connector 20"/>
+          <p:cNvCxnSpPr>
+            <a:endCxn id="14" idx="1"/>
+          </p:cNvCxnSpPr>
+          <p:nvPr/>
+        </p:nvCxnSpPr>
+        <p:spPr>
+          <a:xfrm>
+            <a:off x="7519914" y="3168843"/>
+            <a:ext cx="1269244" cy="2796044"/>
+          </a:xfrm>
+          <a:prstGeom prst="straightConnector1">
+            <a:avLst/>
+          </a:prstGeom>
+          <a:ln>
+            <a:tailEnd type="triangle"/>
+          </a:ln>
+        </p:spPr>
+        <p:style>
+          <a:lnRef idx="1">
+            <a:schemeClr val="accent1"/>
+          </a:lnRef>
+          <a:fillRef idx="0">
+            <a:schemeClr val="accent1"/>
+          </a:fillRef>
+          <a:effectRef idx="0">
+            <a:schemeClr val="accent1"/>
+          </a:effectRef>
+          <a:fontRef idx="minor">
+            <a:schemeClr val="tx1"/>
+          </a:fontRef>
+        </p:style>
+      </p:cxnSp>
+      <p:cxnSp>
+        <p:nvCxnSpPr>
+          <p:cNvPr id="26" name="Straight Arrow Connector 25"/>
+          <p:cNvCxnSpPr>
+            <a:stCxn id="4" idx="1"/>
+            <a:endCxn id="9" idx="3"/>
+          </p:cNvCxnSpPr>
+          <p:nvPr/>
+        </p:nvCxnSpPr>
+        <p:spPr>
+          <a:xfrm flipH="1" flipV="1">
+            <a:off x="3152632" y="1491871"/>
+            <a:ext cx="1269242" cy="1713933"/>
+          </a:xfrm>
+          <a:prstGeom prst="straightConnector1">
+            <a:avLst/>
+          </a:prstGeom>
+        </p:spPr>
+        <p:style>
+          <a:lnRef idx="1">
+            <a:schemeClr val="accent1"/>
+          </a:lnRef>
+          <a:fillRef idx="0">
+            <a:schemeClr val="accent1"/>
+          </a:fillRef>
+          <a:effectRef idx="0">
+            <a:schemeClr val="accent1"/>
+          </a:effectRef>
+          <a:fontRef idx="minor">
+            <a:schemeClr val="tx1"/>
+          </a:fontRef>
+        </p:style>
+      </p:cxnSp>
+      <p:cxnSp>
+        <p:nvCxnSpPr>
+          <p:cNvPr id="28" name="Straight Arrow Connector 27"/>
+          <p:cNvCxnSpPr>
+            <a:endCxn id="13" idx="3"/>
+          </p:cNvCxnSpPr>
+          <p:nvPr/>
+        </p:nvCxnSpPr>
+        <p:spPr>
+          <a:xfrm flipH="1">
+            <a:off x="3152631" y="3205805"/>
+            <a:ext cx="1269241" cy="461543"/>
+          </a:xfrm>
+          <a:prstGeom prst="straightConnector1">
+            <a:avLst/>
+          </a:prstGeom>
+          <a:ln>
+            <a:tailEnd type="triangle"/>
+          </a:ln>
+        </p:spPr>
+        <p:style>
+          <a:lnRef idx="1">
+            <a:schemeClr val="accent1"/>
+          </a:lnRef>
+          <a:fillRef idx="0">
+            <a:schemeClr val="accent1"/>
+          </a:fillRef>
+          <a:effectRef idx="0">
+            <a:schemeClr val="accent1"/>
+          </a:effectRef>
+          <a:fontRef idx="minor">
+            <a:schemeClr val="tx1"/>
+          </a:fontRef>
+        </p:style>
+      </p:cxnSp>
+      <p:cxnSp>
+        <p:nvCxnSpPr>
+          <p:cNvPr id="30" name="Straight Arrow Connector 29"/>
+          <p:cNvCxnSpPr>
+            <a:endCxn id="10" idx="3"/>
+          </p:cNvCxnSpPr>
+          <p:nvPr/>
+        </p:nvCxnSpPr>
+        <p:spPr>
+          <a:xfrm flipH="1">
+            <a:off x="3152631" y="3208893"/>
+            <a:ext cx="1269241" cy="1557000"/>
+          </a:xfrm>
+          <a:prstGeom prst="straightConnector1">
+            <a:avLst/>
+          </a:prstGeom>
+          <a:ln>
+            <a:tailEnd type="triangle"/>
+          </a:ln>
+        </p:spPr>
+        <p:style>
+          <a:lnRef idx="1">
+            <a:schemeClr val="accent1"/>
+          </a:lnRef>
+          <a:fillRef idx="0">
+            <a:schemeClr val="accent1"/>
+          </a:fillRef>
+          <a:effectRef idx="0">
+            <a:schemeClr val="accent1"/>
+          </a:effectRef>
+          <a:fontRef idx="minor">
+            <a:schemeClr val="tx1"/>
+          </a:fontRef>
+        </p:style>
+      </p:cxnSp>
+    </p:spTree>
+    <p:extLst>
+      <p:ext uri="{BB962C8B-B14F-4D97-AF65-F5344CB8AC3E}">
+        <p14:creationId xmlns:p14="http://schemas.microsoft.com/office/powerpoint/2010/main" val="3319785133"/>
+      </p:ext>
+    </p:extLst>
+  </p:cSld>
+  <p:clrMapOvr>
+    <a:masterClrMapping/>
+  </p:clrMapOvr>
+  <p:timing>
+    <p:tnLst>
+      <p:par>
+        <p:cTn id="1" dur="indefinite" restart="never" nodeType="tmRoot"/>
+      </p:par>
+    </p:tnLst>
+  </p:timing>
+</p:sld>
+</file>
+
 <file path=ppt/theme/theme1.xml><?xml version="1.0" encoding="utf-8"?>
 <a:theme xmlns:a="http://schemas.openxmlformats.org/drawingml/2006/main" name="Office Theme">
   <a:themeElements>

</xml_diff>